<commit_message>
Power Point de présentation
</commit_message>
<xml_diff>
--- a/Projet_BigData_Groupe3.pptx
+++ b/Projet_BigData_Groupe3.pptx
@@ -155,11 +155,11 @@
     <p1510:client id="{1C9E9924-FD83-474A-9EDF-6F6B948E21C3}" v="701" dt="2023-12-21T11:14:44.925"/>
     <p1510:client id="{2A345A8B-6CDD-4D12-8F85-DE5DEB68DAD6}" v="348" dt="2023-12-21T13:05:14.945"/>
     <p1510:client id="{2C40618E-D1C0-4EF7-865B-A8C748FDF2A9}" v="75" dt="2023-12-21T11:32:58.109"/>
-    <p1510:client id="{2E1D9AD7-6E58-421A-ACB8-C14BB2CF69BE}" v="121" dt="2023-12-21T14:10:21.755"/>
+    <p1510:client id="{2E1D9AD7-6E58-421A-ACB8-C14BB2CF69BE}" v="124" dt="2023-12-21T14:10:27.084"/>
     <p1510:client id="{39D2D2B2-1207-4507-ACCA-99933CCFC66A}" v="7" dt="2023-12-21T11:14:11.115"/>
     <p1510:client id="{4A6D2430-F4E6-4A5B-B3BC-2A16F72024F3}" v="17" dt="2023-12-21T08:15:50.249"/>
-    <p1510:client id="{5261D142-E281-4C6D-8BED-CB581C3FE071}" v="22" dt="2023-12-21T13:44:31.175"/>
-    <p1510:client id="{55ADC037-3CF3-48C2-8937-B2F7689CE1A0}" v="444" dt="2023-12-21T14:09:37.014"/>
+    <p1510:client id="{5261D142-E281-4C6D-8BED-CB581C3FE071}" v="131" dt="2023-12-21T14:21:53.246"/>
+    <p1510:client id="{55ADC037-3CF3-48C2-8937-B2F7689CE1A0}" v="465" dt="2023-12-21T14:23:08.840"/>
     <p1510:client id="{5F1CE213-C471-4002-9707-9209E86F4E3C}" v="8" dt="2023-12-21T10:32:51.793"/>
     <p1510:client id="{7552966D-CB40-4CD1-89D8-23B383A68E3A}" v="9" dt="2023-12-21T12:34:33.330"/>
     <p1510:client id="{7B15677D-3E52-428F-8EC0-9DC9F5844B0E}" v="677" dt="2023-12-21T08:25:18.764"/>
@@ -531,7 +531,7 @@
   <pc:docChgLst>
     <pc:chgData name="Bassam LARAJ" userId="S::blaraj@diginamic-formation.fr::940a7ace-2ec0-4496-baee-6206ca52e367" providerId="AD" clId="Web-{5261D142-E281-4C6D-8BED-CB581C3FE071}"/>
     <pc:docChg chg="modSld">
-      <pc:chgData name="Bassam LARAJ" userId="S::blaraj@diginamic-formation.fr::940a7ace-2ec0-4496-baee-6206ca52e367" providerId="AD" clId="Web-{5261D142-E281-4C6D-8BED-CB581C3FE071}" dt="2023-12-21T13:44:30.784" v="20" actId="20577"/>
+      <pc:chgData name="Bassam LARAJ" userId="S::blaraj@diginamic-formation.fr::940a7ace-2ec0-4496-baee-6206ca52e367" providerId="AD" clId="Web-{5261D142-E281-4C6D-8BED-CB581C3FE071}" dt="2023-12-21T14:21:48.636" v="73" actId="20577"/>
       <pc:docMkLst>
         <pc:docMk/>
       </pc:docMkLst>
@@ -551,7 +551,7 @@
         </pc:spChg>
       </pc:sldChg>
       <pc:sldChg chg="modSp">
-        <pc:chgData name="Bassam LARAJ" userId="S::blaraj@diginamic-formation.fr::940a7ace-2ec0-4496-baee-6206ca52e367" providerId="AD" clId="Web-{5261D142-E281-4C6D-8BED-CB581C3FE071}" dt="2023-12-21T13:23:30.012" v="9"/>
+        <pc:chgData name="Bassam LARAJ" userId="S::blaraj@diginamic-formation.fr::940a7ace-2ec0-4496-baee-6206ca52e367" providerId="AD" clId="Web-{5261D142-E281-4C6D-8BED-CB581C3FE071}" dt="2023-12-21T14:21:35.573" v="41" actId="20577"/>
         <pc:sldMkLst>
           <pc:docMk/>
           <pc:sldMk cId="3888056668" sldId="278"/>
@@ -572,6 +572,14 @@
             <ac:spMk id="11" creationId="{2AFED61B-B187-939B-8177-0CAB80392630}"/>
           </ac:spMkLst>
         </pc:spChg>
+        <pc:spChg chg="mod">
+          <ac:chgData name="Bassam LARAJ" userId="S::blaraj@diginamic-formation.fr::940a7ace-2ec0-4496-baee-6206ca52e367" providerId="AD" clId="Web-{5261D142-E281-4C6D-8BED-CB581C3FE071}" dt="2023-12-21T14:21:35.573" v="41" actId="20577"/>
+          <ac:spMkLst>
+            <pc:docMk/>
+            <pc:sldMk cId="3888056668" sldId="278"/>
+            <ac:spMk id="19" creationId="{00000000-0000-0000-0000-000000000000}"/>
+          </ac:spMkLst>
+        </pc:spChg>
         <pc:picChg chg="mod modCrop">
           <ac:chgData name="Bassam LARAJ" userId="S::blaraj@diginamic-formation.fr::940a7ace-2ec0-4496-baee-6206ca52e367" providerId="AD" clId="Web-{5261D142-E281-4C6D-8BED-CB581C3FE071}" dt="2023-12-21T13:23:30.012" v="9"/>
           <ac:picMkLst>
@@ -582,7 +590,7 @@
         </pc:picChg>
       </pc:sldChg>
       <pc:sldChg chg="addSp modSp">
-        <pc:chgData name="Bassam LARAJ" userId="S::blaraj@diginamic-formation.fr::940a7ace-2ec0-4496-baee-6206ca52e367" providerId="AD" clId="Web-{5261D142-E281-4C6D-8BED-CB581C3FE071}" dt="2023-12-21T13:44:30.784" v="20" actId="20577"/>
+        <pc:chgData name="Bassam LARAJ" userId="S::blaraj@diginamic-formation.fr::940a7ace-2ec0-4496-baee-6206ca52e367" providerId="AD" clId="Web-{5261D142-E281-4C6D-8BED-CB581C3FE071}" dt="2023-12-21T14:21:48.636" v="73" actId="20577"/>
         <pc:sldMkLst>
           <pc:docMk/>
           <pc:sldMk cId="3501822043" sldId="296"/>
@@ -595,8 +603,16 @@
             <ac:spMk id="9" creationId="{FA1910A4-BE54-C31D-B678-46ABFD82018C}"/>
           </ac:spMkLst>
         </pc:spChg>
+        <pc:spChg chg="mod">
+          <ac:chgData name="Bassam LARAJ" userId="S::blaraj@diginamic-formation.fr::940a7ace-2ec0-4496-baee-6206ca52e367" providerId="AD" clId="Web-{5261D142-E281-4C6D-8BED-CB581C3FE071}" dt="2023-12-21T14:21:48.636" v="73" actId="20577"/>
+          <ac:spMkLst>
+            <pc:docMk/>
+            <pc:sldMk cId="3501822043" sldId="296"/>
+            <ac:spMk id="19" creationId="{5E7E9363-4177-F5A1-A572-568FAAE97475}"/>
+          </ac:spMkLst>
+        </pc:spChg>
         <pc:cxnChg chg="add mod">
-          <ac:chgData name="Bassam LARAJ" userId="S::blaraj@diginamic-formation.fr::940a7ace-2ec0-4496-baee-6206ca52e367" providerId="AD" clId="Web-{5261D142-E281-4C6D-8BED-CB581C3FE071}" dt="2023-12-21T13:42:32.002" v="12" actId="14100"/>
+          <ac:chgData name="Bassam LARAJ" userId="S::blaraj@diginamic-formation.fr::940a7ace-2ec0-4496-baee-6206ca52e367" providerId="AD" clId="Web-{5261D142-E281-4C6D-8BED-CB581C3FE071}" dt="2023-12-21T14:19:15.334" v="21" actId="14100"/>
           <ac:cxnSpMkLst>
             <pc:docMk/>
             <pc:sldMk cId="3501822043" sldId="296"/>
@@ -957,18 +973,18 @@
   <pc:docChgLst>
     <pc:chgData name="Vincent BATAILLE" userId="S::vbataille@diginamic-formation.fr::c5b18661-77cc-4e19-974c-aaca7f71d1b5" providerId="AD" clId="Web-{2E1D9AD7-6E58-421A-ACB8-C14BB2CF69BE}"/>
     <pc:docChg chg="modSld">
-      <pc:chgData name="Vincent BATAILLE" userId="S::vbataille@diginamic-formation.fr::c5b18661-77cc-4e19-974c-aaca7f71d1b5" providerId="AD" clId="Web-{2E1D9AD7-6E58-421A-ACB8-C14BB2CF69BE}" dt="2023-12-21T14:10:21.755" v="89" actId="20577"/>
+      <pc:chgData name="Vincent BATAILLE" userId="S::vbataille@diginamic-formation.fr::c5b18661-77cc-4e19-974c-aaca7f71d1b5" providerId="AD" clId="Web-{2E1D9AD7-6E58-421A-ACB8-C14BB2CF69BE}" dt="2023-12-21T14:10:26.802" v="91" actId="14100"/>
       <pc:docMkLst>
         <pc:docMk/>
       </pc:docMkLst>
       <pc:sldChg chg="modSp">
-        <pc:chgData name="Vincent BATAILLE" userId="S::vbataille@diginamic-formation.fr::c5b18661-77cc-4e19-974c-aaca7f71d1b5" providerId="AD" clId="Web-{2E1D9AD7-6E58-421A-ACB8-C14BB2CF69BE}" dt="2023-12-21T14:10:21.755" v="89" actId="20577"/>
+        <pc:chgData name="Vincent BATAILLE" userId="S::vbataille@diginamic-formation.fr::c5b18661-77cc-4e19-974c-aaca7f71d1b5" providerId="AD" clId="Web-{2E1D9AD7-6E58-421A-ACB8-C14BB2CF69BE}" dt="2023-12-21T14:10:26.802" v="91" actId="14100"/>
         <pc:sldMkLst>
           <pc:docMk/>
           <pc:sldMk cId="2935992840" sldId="275"/>
         </pc:sldMkLst>
         <pc:spChg chg="mod">
-          <ac:chgData name="Vincent BATAILLE" userId="S::vbataille@diginamic-formation.fr::c5b18661-77cc-4e19-974c-aaca7f71d1b5" providerId="AD" clId="Web-{2E1D9AD7-6E58-421A-ACB8-C14BB2CF69BE}" dt="2023-12-21T14:10:21.755" v="89" actId="20577"/>
+          <ac:chgData name="Vincent BATAILLE" userId="S::vbataille@diginamic-formation.fr::c5b18661-77cc-4e19-974c-aaca7f71d1b5" providerId="AD" clId="Web-{2E1D9AD7-6E58-421A-ACB8-C14BB2CF69BE}" dt="2023-12-21T14:10:26.802" v="91" actId="14100"/>
           <ac:spMkLst>
             <pc:docMk/>
             <pc:sldMk cId="2935992840" sldId="275"/>
@@ -2274,10 +2290,25 @@
   <pc:docChgLst>
     <pc:chgData name="Abedayo Candide ALIOLI" userId="S::acalioli@diginamic-formation.fr::c0bf3a19-1525-48d9-9265-377e7f788938" providerId="AD" clId="Web-{55ADC037-3CF3-48C2-8937-B2F7689CE1A0}"/>
     <pc:docChg chg="addSld modSld">
-      <pc:chgData name="Abedayo Candide ALIOLI" userId="S::acalioli@diginamic-formation.fr::c0bf3a19-1525-48d9-9265-377e7f788938" providerId="AD" clId="Web-{55ADC037-3CF3-48C2-8937-B2F7689CE1A0}" dt="2023-12-21T14:09:35.749" v="262" actId="20577"/>
+      <pc:chgData name="Abedayo Candide ALIOLI" userId="S::acalioli@diginamic-formation.fr::c0bf3a19-1525-48d9-9265-377e7f788938" providerId="AD" clId="Web-{55ADC037-3CF3-48C2-8937-B2F7689CE1A0}" dt="2023-12-21T14:23:08.840" v="282" actId="20577"/>
       <pc:docMkLst>
         <pc:docMk/>
       </pc:docMkLst>
+      <pc:sldChg chg="modSp">
+        <pc:chgData name="Abedayo Candide ALIOLI" userId="S::acalioli@diginamic-formation.fr::c0bf3a19-1525-48d9-9265-377e7f788938" providerId="AD" clId="Web-{55ADC037-3CF3-48C2-8937-B2F7689CE1A0}" dt="2023-12-21T14:23:08.840" v="282" actId="20577"/>
+        <pc:sldMkLst>
+          <pc:docMk/>
+          <pc:sldMk cId="1596696435" sldId="262"/>
+        </pc:sldMkLst>
+        <pc:spChg chg="mod">
+          <ac:chgData name="Abedayo Candide ALIOLI" userId="S::acalioli@diginamic-formation.fr::c0bf3a19-1525-48d9-9265-377e7f788938" providerId="AD" clId="Web-{55ADC037-3CF3-48C2-8937-B2F7689CE1A0}" dt="2023-12-21T14:23:08.840" v="282" actId="20577"/>
+          <ac:spMkLst>
+            <pc:docMk/>
+            <pc:sldMk cId="1596696435" sldId="262"/>
+            <ac:spMk id="3" creationId="{00000000-0000-0000-0000-000000000000}"/>
+          </ac:spMkLst>
+        </pc:spChg>
+      </pc:sldChg>
       <pc:sldChg chg="addSp modSp">
         <pc:chgData name="Abedayo Candide ALIOLI" userId="S::acalioli@diginamic-formation.fr::c0bf3a19-1525-48d9-9265-377e7f788938" providerId="AD" clId="Web-{55ADC037-3CF3-48C2-8937-B2F7689CE1A0}" dt="2023-12-21T14:09:35.749" v="262" actId="20577"/>
         <pc:sldMkLst>
@@ -2395,6 +2426,21 @@
             <ac:cxnSpMk id="17" creationId="{00000000-0000-0000-0000-000000000000}"/>
           </ac:cxnSpMkLst>
         </pc:cxnChg>
+      </pc:sldChg>
+      <pc:sldChg chg="modSp">
+        <pc:chgData name="Abedayo Candide ALIOLI" userId="S::acalioli@diginamic-formation.fr::c0bf3a19-1525-48d9-9265-377e7f788938" providerId="AD" clId="Web-{55ADC037-3CF3-48C2-8937-B2F7689CE1A0}" dt="2023-12-21T14:19:35.605" v="267" actId="20577"/>
+        <pc:sldMkLst>
+          <pc:docMk/>
+          <pc:sldMk cId="3391074834" sldId="286"/>
+        </pc:sldMkLst>
+        <pc:spChg chg="mod">
+          <ac:chgData name="Abedayo Candide ALIOLI" userId="S::acalioli@diginamic-formation.fr::c0bf3a19-1525-48d9-9265-377e7f788938" providerId="AD" clId="Web-{55ADC037-3CF3-48C2-8937-B2F7689CE1A0}" dt="2023-12-21T14:19:35.605" v="267" actId="20577"/>
+          <ac:spMkLst>
+            <pc:docMk/>
+            <pc:sldMk cId="3391074834" sldId="286"/>
+            <ac:spMk id="3" creationId="{00000000-0000-0000-0000-000000000000}"/>
+          </ac:spMkLst>
+        </pc:spChg>
       </pc:sldChg>
       <pc:sldChg chg="addSp delSp modSp add replId">
         <pc:chgData name="Abedayo Candide ALIOLI" userId="S::acalioli@diginamic-formation.fr::c0bf3a19-1525-48d9-9265-377e7f788938" providerId="AD" clId="Web-{55ADC037-3CF3-48C2-8937-B2F7689CE1A0}" dt="2023-12-21T14:07:03.315" v="241" actId="20577"/>
@@ -11318,7 +11364,11 @@
               </a:rPr>
               <a:t>Introduction</a:t>
             </a:r>
-            <a:endParaRPr lang="fr-FR"/>
+            <a:endParaRPr lang="fr-FR">
+              <a:solidFill>
+                <a:schemeClr val="tx1"/>
+              </a:solidFill>
+            </a:endParaRPr>
           </a:p>
           <a:p>
             <a:pPr marL="383540" indent="-383540">
@@ -11365,7 +11415,7 @@
                 <a:ea typeface="Source Code Pro Semibold"/>
                 <a:cs typeface="Arial"/>
               </a:rPr>
-              <a:t>Descriptions des données brutes</a:t>
+              <a:t>Description des données brutes</a:t>
             </a:r>
           </a:p>
           <a:p>
@@ -11433,7 +11483,7 @@
                 <a:ea typeface="Source Code Pro Semibold"/>
                 <a:cs typeface="Arial"/>
               </a:rPr>
-              <a:t>Tableaux de bord</a:t>
+              <a:t>Tableaux de bord et conclusion</a:t>
             </a:r>
             <a:endParaRPr lang="fr-FR">
               <a:solidFill>
@@ -12745,7 +12795,7 @@
                 <a:ea typeface="Source Code Pro"/>
                 <a:cs typeface="+mn-lt"/>
               </a:rPr>
-              <a:t>Création de la table (</a:t>
+              <a:t>CSV vers HBASE (</a:t>
             </a:r>
             <a:r>
               <a:rPr lang="fr-FR" sz="2000" b="1" i="1">
@@ -13604,7 +13654,7 @@
                 <a:ea typeface="Source Code Pro"/>
                 <a:cs typeface="+mn-lt"/>
               </a:rPr>
-              <a:t>Création de la table (</a:t>
+              <a:t>CSV vers HBASE (</a:t>
             </a:r>
             <a:r>
               <a:rPr lang="fr-FR" sz="2000" b="1" i="1">
@@ -14288,7 +14338,7 @@
         <p:spPr>
           <a:xfrm flipH="1" flipV="1">
             <a:off x="7748152" y="2388176"/>
-            <a:ext cx="1094510" cy="765465"/>
+            <a:ext cx="1129146" cy="644238"/>
           </a:xfrm>
           <a:prstGeom prst="straightConnector1">
             <a:avLst/>
@@ -16956,7 +17006,7 @@
         <p:spPr>
           <a:xfrm>
             <a:off x="1188589" y="1396818"/>
-            <a:ext cx="10602357" cy="4683140"/>
+            <a:ext cx="10602357" cy="4014067"/>
           </a:xfrm>
         </p:spPr>
         <p:txBody>
@@ -18588,7 +18638,7 @@
                 <a:ea typeface="Source Code Pro"/>
                 <a:cs typeface="+mn-lt"/>
               </a:rPr>
-              <a:t>MapeReduce</a:t>
+              <a:t>Map-Reduce</a:t>
             </a:r>
             <a:r>
               <a:rPr lang="fr-FR" b="1">

</xml_diff>